<commit_message>
fixes to Bite1 presentation
</commit_message>
<xml_diff>
--- a/Resources/ConsumingRustBite1.pptx
+++ b/Resources/ConsumingRustBite1.pptx
@@ -3409,7 +3409,7 @@
             </a:br>
             <a:r>
               <a:rPr lang="en-US" sz="4000" dirty="0"/>
-              <a:t>Part 1 - Data</a:t>
+              <a:t>Bite 1 - Data</a:t>
             </a:r>
             <a:endParaRPr lang="en-US" dirty="0"/>
           </a:p>
@@ -3707,7 +3707,7 @@
             <a:pPr algn="l"/>
             <a:r>
               <a:rPr lang="en-US" dirty="0"/>
-              <a:t>Bite #2 covers data ownership, taking us into the core of what makes Rust the language that it is.</a:t>
+              <a:t>Bite #2 illustrates undefined behavior with C++ code, showing us why we need Rust.</a:t>
             </a:r>
           </a:p>
         </p:txBody>
@@ -4817,41 +4817,6 @@
       </p:sp>
       <p:pic>
         <p:nvPicPr>
-          <p:cNvPr id="5" name="Content Placeholder 4" descr="A screenshot of a cell phone&#10;&#10;Description automatically generated">
-            <a:extLst>
-              <a:ext uri="{FF2B5EF4-FFF2-40B4-BE49-F238E27FC236}">
-                <a16:creationId xmlns:a16="http://schemas.microsoft.com/office/drawing/2014/main" id="{8D4D2D88-8800-44EA-9070-21F256F1500C}"/>
-              </a:ext>
-            </a:extLst>
-          </p:cNvPr>
-          <p:cNvPicPr>
-            <a:picLocks noGrp="1" noChangeAspect="1"/>
-          </p:cNvPicPr>
-          <p:nvPr>
-            <p:ph idx="1"/>
-          </p:nvPr>
-        </p:nvPicPr>
-        <p:blipFill>
-          <a:blip r:embed="rId2">
-            <a:extLst>
-              <a:ext uri="{28A0092B-C50C-407E-A947-70E740481C1C}">
-                <a14:useLocalDpi xmlns:a14="http://schemas.microsoft.com/office/drawing/2010/main" val="0"/>
-              </a:ext>
-            </a:extLst>
-          </a:blip>
-          <a:stretch>
-            <a:fillRect/>
-          </a:stretch>
-        </p:blipFill>
-        <p:spPr>
-          <a:xfrm>
-            <a:off x="7337650" y="444754"/>
-            <a:ext cx="3898450" cy="2788801"/>
-          </a:xfrm>
-        </p:spPr>
-      </p:pic>
-      <p:pic>
-        <p:nvPicPr>
           <p:cNvPr id="7" name="Picture 6" descr="A screenshot of a cell phone&#10;&#10;Description automatically generated">
             <a:extLst>
               <a:ext uri="{FF2B5EF4-FFF2-40B4-BE49-F238E27FC236}">
@@ -4865,7 +4830,7 @@
           <p:nvPr/>
         </p:nvPicPr>
         <p:blipFill>
-          <a:blip r:embed="rId3">
+          <a:blip r:embed="rId2">
             <a:extLst>
               <a:ext uri="{28A0092B-C50C-407E-A947-70E740481C1C}">
                 <a14:useLocalDpi xmlns:a14="http://schemas.microsoft.com/office/drawing/2010/main" val="0"/>
@@ -5018,6 +4983,127 @@
             <a:r>
               <a:rPr lang="en-US" sz="2400" dirty="0"/>
               <a:t>Clone copies resources to the target.</a:t>
+            </a:r>
+          </a:p>
+        </p:txBody>
+      </p:sp>
+      <p:pic>
+        <p:nvPicPr>
+          <p:cNvPr id="9" name="Content Placeholder 8" descr="A screenshot of a cell phone&#10;&#10;Description automatically generated">
+            <a:extLst>
+              <a:ext uri="{FF2B5EF4-FFF2-40B4-BE49-F238E27FC236}">
+                <a16:creationId xmlns:a16="http://schemas.microsoft.com/office/drawing/2014/main" id="{B6FD3C6D-99D5-4250-AD79-D1606D05C338}"/>
+              </a:ext>
+            </a:extLst>
+          </p:cNvPr>
+          <p:cNvPicPr>
+            <a:picLocks noGrp="1" noChangeAspect="1"/>
+          </p:cNvPicPr>
+          <p:nvPr>
+            <p:ph idx="1"/>
+          </p:nvPr>
+        </p:nvPicPr>
+        <p:blipFill>
+          <a:blip r:embed="rId3">
+            <a:extLst>
+              <a:ext uri="{28A0092B-C50C-407E-A947-70E740481C1C}">
+                <a14:useLocalDpi xmlns:a14="http://schemas.microsoft.com/office/drawing/2010/main" val="0"/>
+              </a:ext>
+            </a:extLst>
+          </a:blip>
+          <a:stretch>
+            <a:fillRect/>
+          </a:stretch>
+        </p:blipFill>
+        <p:spPr>
+          <a:xfrm>
+            <a:off x="7022032" y="354179"/>
+            <a:ext cx="4260967" cy="2959004"/>
+          </a:xfrm>
+        </p:spPr>
+      </p:pic>
+      <p:sp>
+        <p:nvSpPr>
+          <p:cNvPr id="11" name="TextBox 10">
+            <a:extLst>
+              <a:ext uri="{FF2B5EF4-FFF2-40B4-BE49-F238E27FC236}">
+                <a16:creationId xmlns:a16="http://schemas.microsoft.com/office/drawing/2014/main" id="{21B45595-CCBB-477A-A699-B260A46CAB43}"/>
+              </a:ext>
+            </a:extLst>
+          </p:cNvPr>
+          <p:cNvSpPr txBox="1"/>
+          <p:nvPr/>
+        </p:nvSpPr>
+        <p:spPr>
+          <a:xfrm>
+            <a:off x="10383559" y="2197016"/>
+            <a:ext cx="970241" cy="369332"/>
+          </a:xfrm>
+          <a:prstGeom prst="rect">
+            <a:avLst/>
+          </a:prstGeom>
+          <a:solidFill>
+            <a:schemeClr val="bg1"/>
+          </a:solidFill>
+          <a:ln w="12700">
+            <a:solidFill>
+              <a:schemeClr val="tx1"/>
+            </a:solidFill>
+          </a:ln>
+        </p:spPr>
+        <p:txBody>
+          <a:bodyPr wrap="square" rtlCol="0">
+            <a:spAutoFit/>
+          </a:bodyPr>
+          <a:lstStyle/>
+          <a:p>
+            <a:pPr algn="ctr"/>
+            <a:r>
+              <a:rPr lang="en-US" dirty="0"/>
+              <a:t>Move</a:t>
+            </a:r>
+          </a:p>
+        </p:txBody>
+      </p:sp>
+      <p:sp>
+        <p:nvSpPr>
+          <p:cNvPr id="12" name="TextBox 11">
+            <a:extLst>
+              <a:ext uri="{FF2B5EF4-FFF2-40B4-BE49-F238E27FC236}">
+                <a16:creationId xmlns:a16="http://schemas.microsoft.com/office/drawing/2014/main" id="{4DE9586C-5DDB-4EBD-9AED-D4DCC5CEC8A6}"/>
+              </a:ext>
+            </a:extLst>
+          </p:cNvPr>
+          <p:cNvSpPr txBox="1"/>
+          <p:nvPr/>
+        </p:nvSpPr>
+        <p:spPr>
+          <a:xfrm>
+            <a:off x="10383559" y="5176185"/>
+            <a:ext cx="970241" cy="369332"/>
+          </a:xfrm>
+          <a:prstGeom prst="rect">
+            <a:avLst/>
+          </a:prstGeom>
+          <a:solidFill>
+            <a:schemeClr val="bg1"/>
+          </a:solidFill>
+          <a:ln w="12700">
+            <a:solidFill>
+              <a:schemeClr val="tx1"/>
+            </a:solidFill>
+          </a:ln>
+        </p:spPr>
+        <p:txBody>
+          <a:bodyPr wrap="square" rtlCol="0">
+            <a:spAutoFit/>
+          </a:bodyPr>
+          <a:lstStyle/>
+          <a:p>
+            <a:pPr algn="ctr"/>
+            <a:r>
+              <a:rPr lang="en-US" dirty="0"/>
+              <a:t>Clone</a:t>
             </a:r>
           </a:p>
         </p:txBody>

</xml_diff>

<commit_message>
fixed type, link errors
</commit_message>
<xml_diff>
--- a/Resources/ConsumingRustBite1.pptx
+++ b/Resources/ConsumingRustBite1.pptx
@@ -4579,8 +4579,13 @@
             <a:pPr lvl="1"/>
             <a:r>
               <a:rPr lang="en-US" dirty="0"/>
-              <a:t>There are rules about ownership that we discuss in Bite #2.</a:t>
-            </a:r>
+              <a:t>There are rules about ownership that we discuss in </a:t>
+            </a:r>
+            <a:r>
+              <a:rPr lang="en-US"/>
+              <a:t>Bite #3.</a:t>
+            </a:r>
+            <a:endParaRPr lang="en-US" dirty="0"/>
           </a:p>
           <a:p>
             <a:pPr lvl="1"/>

</xml_diff>

<commit_message>
updated text in ConsumingRustBite1
</commit_message>
<xml_diff>
--- a/Resources/ConsumingRustBite1.pptx
+++ b/Resources/ConsumingRustBite1.pptx
@@ -15,7 +15,8 @@
     <p:sldId id="263" r:id="rId9"/>
     <p:sldId id="261" r:id="rId10"/>
     <p:sldId id="266" r:id="rId11"/>
-    <p:sldId id="265" r:id="rId12"/>
+    <p:sldId id="267" r:id="rId12"/>
+    <p:sldId id="265" r:id="rId13"/>
   </p:sldIdLst>
   <p:sldSz cx="12192000" cy="6858000"/>
   <p:notesSz cx="6858000" cy="9144000"/>
@@ -277,7 +278,7 @@
           <a:p>
             <a:fld id="{0EFE2675-32ED-497E-A2F7-9E43B37B7B14}" type="datetimeFigureOut">
               <a:rPr lang="en-US" smtClean="0"/>
-              <a:t>5/28/2020</a:t>
+              <a:t>5/29/2020</a:t>
             </a:fld>
             <a:endParaRPr lang="en-US"/>
           </a:p>
@@ -475,7 +476,7 @@
           <a:p>
             <a:fld id="{0EFE2675-32ED-497E-A2F7-9E43B37B7B14}" type="datetimeFigureOut">
               <a:rPr lang="en-US" smtClean="0"/>
-              <a:t>5/28/2020</a:t>
+              <a:t>5/29/2020</a:t>
             </a:fld>
             <a:endParaRPr lang="en-US"/>
           </a:p>
@@ -683,7 +684,7 @@
           <a:p>
             <a:fld id="{0EFE2675-32ED-497E-A2F7-9E43B37B7B14}" type="datetimeFigureOut">
               <a:rPr lang="en-US" smtClean="0"/>
-              <a:t>5/28/2020</a:t>
+              <a:t>5/29/2020</a:t>
             </a:fld>
             <a:endParaRPr lang="en-US"/>
           </a:p>
@@ -891,7 +892,7 @@
           <a:p>
             <a:fld id="{0EFE2675-32ED-497E-A2F7-9E43B37B7B14}" type="datetimeFigureOut">
               <a:rPr lang="en-US" smtClean="0"/>
-              <a:t>5/28/2020</a:t>
+              <a:t>5/29/2020</a:t>
             </a:fld>
             <a:endParaRPr lang="en-US"/>
           </a:p>
@@ -1166,7 +1167,7 @@
           <a:p>
             <a:fld id="{0EFE2675-32ED-497E-A2F7-9E43B37B7B14}" type="datetimeFigureOut">
               <a:rPr lang="en-US" smtClean="0"/>
-              <a:t>5/28/2020</a:t>
+              <a:t>5/29/2020</a:t>
             </a:fld>
             <a:endParaRPr lang="en-US"/>
           </a:p>
@@ -1436,7 +1437,7 @@
           <a:p>
             <a:fld id="{0EFE2675-32ED-497E-A2F7-9E43B37B7B14}" type="datetimeFigureOut">
               <a:rPr lang="en-US" smtClean="0"/>
-              <a:t>5/28/2020</a:t>
+              <a:t>5/29/2020</a:t>
             </a:fld>
             <a:endParaRPr lang="en-US"/>
           </a:p>
@@ -1848,7 +1849,7 @@
           <a:p>
             <a:fld id="{0EFE2675-32ED-497E-A2F7-9E43B37B7B14}" type="datetimeFigureOut">
               <a:rPr lang="en-US" smtClean="0"/>
-              <a:t>5/28/2020</a:t>
+              <a:t>5/29/2020</a:t>
             </a:fld>
             <a:endParaRPr lang="en-US"/>
           </a:p>
@@ -1994,7 +1995,7 @@
           <a:p>
             <a:fld id="{0EFE2675-32ED-497E-A2F7-9E43B37B7B14}" type="datetimeFigureOut">
               <a:rPr lang="en-US" smtClean="0"/>
-              <a:t>5/28/2020</a:t>
+              <a:t>5/29/2020</a:t>
             </a:fld>
             <a:endParaRPr lang="en-US"/>
           </a:p>
@@ -2107,7 +2108,7 @@
           <a:p>
             <a:fld id="{0EFE2675-32ED-497E-A2F7-9E43B37B7B14}" type="datetimeFigureOut">
               <a:rPr lang="en-US" smtClean="0"/>
-              <a:t>5/28/2020</a:t>
+              <a:t>5/29/2020</a:t>
             </a:fld>
             <a:endParaRPr lang="en-US"/>
           </a:p>
@@ -2418,7 +2419,7 @@
           <a:p>
             <a:fld id="{0EFE2675-32ED-497E-A2F7-9E43B37B7B14}" type="datetimeFigureOut">
               <a:rPr lang="en-US" smtClean="0"/>
-              <a:t>5/28/2020</a:t>
+              <a:t>5/29/2020</a:t>
             </a:fld>
             <a:endParaRPr lang="en-US"/>
           </a:p>
@@ -2706,7 +2707,7 @@
           <a:p>
             <a:fld id="{0EFE2675-32ED-497E-A2F7-9E43B37B7B14}" type="datetimeFigureOut">
               <a:rPr lang="en-US" smtClean="0"/>
-              <a:t>5/28/2020</a:t>
+              <a:t>5/29/2020</a:t>
             </a:fld>
             <a:endParaRPr lang="en-US"/>
           </a:p>
@@ -2947,7 +2948,7 @@
           <a:p>
             <a:fld id="{0EFE2675-32ED-497E-A2F7-9E43B37B7B14}" type="datetimeFigureOut">
               <a:rPr lang="en-US" smtClean="0"/>
-              <a:t>5/28/2020</a:t>
+              <a:t>5/29/2020</a:t>
             </a:fld>
             <a:endParaRPr lang="en-US"/>
           </a:p>
@@ -3383,7 +3384,7 @@
         <p:spPr>
           <a:xfrm>
             <a:off x="1524000" y="762581"/>
-            <a:ext cx="9144000" cy="2806021"/>
+            <a:ext cx="9144000" cy="2666419"/>
           </a:xfrm>
         </p:spPr>
         <p:txBody>
@@ -3391,27 +3392,23 @@
           <a:lstStyle/>
           <a:p>
             <a:r>
-              <a:rPr lang="en-US" sz="5400" dirty="0"/>
-              <a:t>Consuming Rust</a:t>
+              <a:rPr lang="en-US" sz="4000" dirty="0"/>
+              <a:t>Consuming Rust bite by byte</a:t>
             </a:r>
             <a:br>
-              <a:rPr lang="en-US" sz="5400" dirty="0"/>
-            </a:br>
-            <a:r>
-              <a:rPr lang="en-US" sz="5400" dirty="0"/>
-              <a:t>bite by byte</a:t>
-            </a:r>
-            <a:br>
-              <a:rPr lang="en-US" sz="5400" dirty="0"/>
+              <a:rPr lang="en-US" sz="4000" dirty="0"/>
             </a:br>
             <a:br>
               <a:rPr lang="en-US" sz="3200" dirty="0"/>
             </a:br>
-            <a:r>
-              <a:rPr lang="en-US" sz="4000" dirty="0"/>
+            <a:br>
+              <a:rPr lang="en-US" sz="3200" dirty="0"/>
+            </a:br>
+            <a:r>
+              <a:rPr lang="en-US" sz="4800" b="1" dirty="0"/>
               <a:t>Bite 1 - Data</a:t>
             </a:r>
-            <a:endParaRPr lang="en-US" dirty="0"/>
+            <a:endParaRPr lang="en-US" b="1" dirty="0"/>
           </a:p>
         </p:txBody>
       </p:sp>
@@ -3604,7 +3601,7 @@
             </a:r>
             <a:r>
               <a:rPr lang="en-US" dirty="0"/>
-              <a:t>, and </a:t>
+              <a:t>, </a:t>
             </a:r>
             <a:r>
               <a:rPr lang="en-US" dirty="0" err="1"/>
@@ -3612,7 +3609,7 @@
             </a:r>
             <a:r>
               <a:rPr lang="en-US" dirty="0"/>
-              <a:t> are non-blittable.</a:t>
+              <a:t>, and Maps are non-blittable.</a:t>
             </a:r>
           </a:p>
           <a:p>
@@ -3652,6 +3649,250 @@
       </p:grpSpPr>
       <p:sp>
         <p:nvSpPr>
+          <p:cNvPr id="2" name="Title 1">
+            <a:extLst>
+              <a:ext uri="{FF2B5EF4-FFF2-40B4-BE49-F238E27FC236}">
+                <a16:creationId xmlns:a16="http://schemas.microsoft.com/office/drawing/2014/main" id="{58AC9723-8DE0-4A3D-B6AD-724FC3DCD5C8}"/>
+              </a:ext>
+            </a:extLst>
+          </p:cNvPr>
+          <p:cNvSpPr>
+            <a:spLocks noGrp="1"/>
+          </p:cNvSpPr>
+          <p:nvPr>
+            <p:ph type="title"/>
+          </p:nvPr>
+        </p:nvSpPr>
+        <p:spPr/>
+        <p:txBody>
+          <a:bodyPr/>
+          <a:lstStyle/>
+          <a:p>
+            <a:r>
+              <a:rPr lang="en-US" dirty="0"/>
+              <a:t>References</a:t>
+            </a:r>
+          </a:p>
+        </p:txBody>
+      </p:sp>
+      <p:graphicFrame>
+        <p:nvGraphicFramePr>
+          <p:cNvPr id="4" name="Table 4">
+            <a:extLst>
+              <a:ext uri="{FF2B5EF4-FFF2-40B4-BE49-F238E27FC236}">
+                <a16:creationId xmlns:a16="http://schemas.microsoft.com/office/drawing/2014/main" id="{F49941E0-322C-467C-89AB-4BD24B25EC7D}"/>
+              </a:ext>
+            </a:extLst>
+          </p:cNvPr>
+          <p:cNvGraphicFramePr>
+            <a:graphicFrameLocks noGrp="1"/>
+          </p:cNvGraphicFramePr>
+          <p:nvPr>
+            <p:ph idx="1"/>
+            <p:extLst>
+              <p:ext uri="{D42A27DB-BD31-4B8C-83A1-F6EECF244321}">
+                <p14:modId xmlns:p14="http://schemas.microsoft.com/office/powerpoint/2010/main" val="1681421273"/>
+              </p:ext>
+            </p:extLst>
+          </p:nvPr>
+        </p:nvGraphicFramePr>
+        <p:xfrm>
+          <a:off x="838200" y="1341438"/>
+          <a:ext cx="10515600" cy="1483360"/>
+        </p:xfrm>
+        <a:graphic>
+          <a:graphicData uri="http://schemas.openxmlformats.org/drawingml/2006/table">
+            <a:tbl>
+              <a:tblPr firstRow="1" bandRow="1">
+                <a:tableStyleId>{F5AB1C69-6EDB-4FF4-983F-18BD219EF322}</a:tableStyleId>
+              </a:tblPr>
+              <a:tblGrid>
+                <a:gridCol w="3831522">
+                  <a:extLst>
+                    <a:ext uri="{9D8B030D-6E8A-4147-A177-3AD203B41FA5}">
+                      <a16:colId xmlns:a16="http://schemas.microsoft.com/office/drawing/2014/main" val="129708743"/>
+                    </a:ext>
+                  </a:extLst>
+                </a:gridCol>
+                <a:gridCol w="6684078">
+                  <a:extLst>
+                    <a:ext uri="{9D8B030D-6E8A-4147-A177-3AD203B41FA5}">
+                      <a16:colId xmlns:a16="http://schemas.microsoft.com/office/drawing/2014/main" val="2429944823"/>
+                    </a:ext>
+                  </a:extLst>
+                </a:gridCol>
+              </a:tblGrid>
+              <a:tr h="370840">
+                <a:tc>
+                  <a:txBody>
+                    <a:bodyPr/>
+                    <a:lstStyle/>
+                    <a:p>
+                      <a:r>
+                        <a:rPr lang="en-US" dirty="0"/>
+                        <a:t>Link</a:t>
+                      </a:r>
+                    </a:p>
+                  </a:txBody>
+                  <a:tcPr/>
+                </a:tc>
+                <a:tc>
+                  <a:txBody>
+                    <a:bodyPr/>
+                    <a:lstStyle/>
+                    <a:p>
+                      <a:r>
+                        <a:rPr lang="en-US" dirty="0"/>
+                        <a:t>Description</a:t>
+                      </a:r>
+                    </a:p>
+                  </a:txBody>
+                  <a:tcPr/>
+                </a:tc>
+                <a:extLst>
+                  <a:ext uri="{0D108BD9-81ED-4DB2-BD59-A6C34878D82A}">
+                    <a16:rowId xmlns:a16="http://schemas.microsoft.com/office/drawing/2014/main" val="3197276564"/>
+                  </a:ext>
+                </a:extLst>
+              </a:tr>
+              <a:tr h="370840">
+                <a:tc>
+                  <a:txBody>
+                    <a:bodyPr/>
+                    <a:lstStyle/>
+                    <a:p>
+                      <a:r>
+                        <a:rPr lang="en-US" dirty="0">
+                          <a:hlinkClick r:id="rId2" action="ppaction://hlinkfile"/>
+                        </a:rPr>
+                        <a:t>ConsumingRustBite2</a:t>
+                      </a:r>
+                      <a:r>
+                        <a:rPr lang="en-US" dirty="0"/>
+                        <a:t> - UDB</a:t>
+                      </a:r>
+                    </a:p>
+                  </a:txBody>
+                  <a:tcPr/>
+                </a:tc>
+                <a:tc>
+                  <a:txBody>
+                    <a:bodyPr/>
+                    <a:lstStyle/>
+                    <a:p>
+                      <a:r>
+                        <a:rPr lang="en-US" dirty="0"/>
+                        <a:t>Undefined behavior – example from C++ code</a:t>
+                      </a:r>
+                    </a:p>
+                  </a:txBody>
+                  <a:tcPr/>
+                </a:tc>
+                <a:extLst>
+                  <a:ext uri="{0D108BD9-81ED-4DB2-BD59-A6C34878D82A}">
+                    <a16:rowId xmlns:a16="http://schemas.microsoft.com/office/drawing/2014/main" val="1548045816"/>
+                  </a:ext>
+                </a:extLst>
+              </a:tr>
+              <a:tr h="370840">
+                <a:tc>
+                  <a:txBody>
+                    <a:bodyPr/>
+                    <a:lstStyle/>
+                    <a:p>
+                      <a:r>
+                        <a:rPr lang="en-US" dirty="0">
+                          <a:hlinkClick r:id="rId3"/>
+                        </a:rPr>
+                        <a:t>Rust Story - Data</a:t>
+                      </a:r>
+                      <a:endParaRPr lang="en-US" dirty="0"/>
+                    </a:p>
+                  </a:txBody>
+                  <a:tcPr/>
+                </a:tc>
+                <a:tc>
+                  <a:txBody>
+                    <a:bodyPr/>
+                    <a:lstStyle/>
+                    <a:p>
+                      <a:r>
+                        <a:rPr lang="en-US" dirty="0"/>
+                        <a:t>Expanded discussion in Rust Story</a:t>
+                      </a:r>
+                    </a:p>
+                  </a:txBody>
+                  <a:tcPr/>
+                </a:tc>
+                <a:extLst>
+                  <a:ext uri="{0D108BD9-81ED-4DB2-BD59-A6C34878D82A}">
+                    <a16:rowId xmlns:a16="http://schemas.microsoft.com/office/drawing/2014/main" val="2828727795"/>
+                  </a:ext>
+                </a:extLst>
+              </a:tr>
+              <a:tr h="370840">
+                <a:tc>
+                  <a:txBody>
+                    <a:bodyPr/>
+                    <a:lstStyle/>
+                    <a:p>
+                      <a:endParaRPr lang="en-US"/>
+                    </a:p>
+                  </a:txBody>
+                  <a:tcPr/>
+                </a:tc>
+                <a:tc>
+                  <a:txBody>
+                    <a:bodyPr/>
+                    <a:lstStyle/>
+                    <a:p>
+                      <a:endParaRPr lang="en-US" dirty="0"/>
+                    </a:p>
+                  </a:txBody>
+                  <a:tcPr/>
+                </a:tc>
+                <a:extLst>
+                  <a:ext uri="{0D108BD9-81ED-4DB2-BD59-A6C34878D82A}">
+                    <a16:rowId xmlns:a16="http://schemas.microsoft.com/office/drawing/2014/main" val="863928394"/>
+                  </a:ext>
+                </a:extLst>
+              </a:tr>
+            </a:tbl>
+          </a:graphicData>
+        </a:graphic>
+      </p:graphicFrame>
+    </p:spTree>
+    <p:extLst>
+      <p:ext uri="{BB962C8B-B14F-4D97-AF65-F5344CB8AC3E}">
+        <p14:creationId xmlns:p14="http://schemas.microsoft.com/office/powerpoint/2010/main" val="1851004617"/>
+      </p:ext>
+    </p:extLst>
+  </p:cSld>
+  <p:clrMapOvr>
+    <a:masterClrMapping/>
+  </p:clrMapOvr>
+</p:sld>
+</file>
+
+<file path=ppt/slides/slide12.xml><?xml version="1.0" encoding="utf-8"?>
+<p:sld xmlns:a="http://schemas.openxmlformats.org/drawingml/2006/main" xmlns:r="http://schemas.openxmlformats.org/officeDocument/2006/relationships" xmlns:p="http://schemas.openxmlformats.org/presentationml/2006/main">
+  <p:cSld>
+    <p:spTree>
+      <p:nvGrpSpPr>
+        <p:cNvPr id="1" name=""/>
+        <p:cNvGrpSpPr/>
+        <p:nvPr/>
+      </p:nvGrpSpPr>
+      <p:grpSpPr>
+        <a:xfrm>
+          <a:off x="0" y="0"/>
+          <a:ext cx="0" cy="0"/>
+          <a:chOff x="0" y="0"/>
+          <a:chExt cx="0" cy="0"/>
+        </a:xfrm>
+      </p:grpSpPr>
+      <p:sp>
+        <p:nvSpPr>
           <p:cNvPr id="4" name="Title 3">
             <a:extLst>
               <a:ext uri="{FF2B5EF4-FFF2-40B4-BE49-F238E27FC236}">
@@ -3941,8 +4182,12 @@
           <a:p>
             <a:r>
               <a:rPr lang="en-US" dirty="0"/>
-              <a:t>This is the first in a series of brief presentations about the Rust programming language:</a:t>
-            </a:r>
+              <a:t>This is the first in a series of bites - brief presentations - about the Rust programming language:</a:t>
+            </a:r>
+            <a:br>
+              <a:rPr lang="en-US" dirty="0"/>
+            </a:br>
+            <a:endParaRPr lang="en-US" dirty="0"/>
           </a:p>
           <a:p>
             <a:pPr lvl="1"/>
@@ -4050,6 +4295,10 @@
               <a:rPr lang="en-US" dirty="0"/>
               <a:t>Our goal is to understand the terms:</a:t>
             </a:r>
+            <a:br>
+              <a:rPr lang="en-US" dirty="0"/>
+            </a:br>
+            <a:endParaRPr lang="en-US" dirty="0"/>
           </a:p>
           <a:p>
             <a:pPr lvl="1"/>
@@ -4162,7 +4411,7 @@
           <a:p>
             <a:r>
               <a:rPr lang="en-US" dirty="0"/>
-              <a:t>Bind – associating an identifier with a memory location</a:t>
+              <a:t>Bind – associate an identifier with a memory location</a:t>
             </a:r>
           </a:p>
           <a:p>
@@ -4451,7 +4700,7 @@
               <a:rPr lang="en-US" sz="2000" dirty="0">
                 <a:latin typeface="Consolas" panose="020B0609020204030204" pitchFamily="49" charset="0"/>
               </a:rPr>
-              <a:t>Non-blittable types occupy more than one memory location, usually one contiguous block on the stack and possibly one block on the heap.</a:t>
+              <a:t>Non-blittable types occupy more than one memory location, usually one contiguous block on the stack and one or more blocks on the heap.</a:t>
             </a:r>
           </a:p>
           <a:p>
@@ -4560,6 +4809,10 @@
               <a:rPr lang="en-US" dirty="0"/>
               <a:t>Ownership in Rust is an interesting concept.</a:t>
             </a:r>
+            <a:br>
+              <a:rPr lang="en-US" dirty="0"/>
+            </a:br>
+            <a:endParaRPr lang="en-US" dirty="0"/>
           </a:p>
           <a:p>
             <a:pPr lvl="1"/>
@@ -4579,19 +4832,29 @@
             <a:pPr lvl="1"/>
             <a:r>
               <a:rPr lang="en-US" dirty="0"/>
-              <a:t>There are rules about ownership that we discuss in </a:t>
-            </a:r>
-            <a:r>
-              <a:rPr lang="en-US"/>
-              <a:t>Bite #3.</a:t>
-            </a:r>
-            <a:endParaRPr lang="en-US" dirty="0"/>
+              <a:t>There are rules about ownership that we discuss in Bite #3.</a:t>
+            </a:r>
           </a:p>
           <a:p>
             <a:pPr lvl="1"/>
             <a:r>
               <a:rPr lang="en-US" dirty="0"/>
               <a:t>Following Rust’s ownership rules makes Rust code memory-safe.</a:t>
+            </a:r>
+          </a:p>
+          <a:p>
+            <a:pPr lvl="2"/>
+            <a:r>
+              <a:rPr lang="en-US" dirty="0"/>
+              <a:t>Enforced by </a:t>
+            </a:r>
+            <a:r>
+              <a:rPr lang="en-US" dirty="0" err="1"/>
+              <a:t>rustc</a:t>
+            </a:r>
+            <a:r>
+              <a:rPr lang="en-US" dirty="0"/>
+              <a:t>, the Rust compiler</a:t>
             </a:r>
           </a:p>
           <a:p>
@@ -4705,7 +4968,7 @@
             <a:pPr lvl="1"/>
             <a:r>
               <a:rPr lang="en-US" dirty="0"/>
-              <a:t>A trait is, like an interface, a specification of a contract.  Copy contract requires Rust code to copy data with that trait.</a:t>
+              <a:t>A trait is, like an interface, a specification of a contract.  Copy contract requires Rust code, when binding, to copy data with that trait.</a:t>
             </a:r>
             <a:endParaRPr lang="en-US" dirty="0">
               <a:latin typeface="Consolas" panose="020B0609020204030204" pitchFamily="49" charset="0"/>
@@ -4871,7 +5134,7 @@
         <p:spPr>
           <a:xfrm>
             <a:off x="893460" y="1277368"/>
-            <a:ext cx="6326490" cy="4685898"/>
+            <a:ext cx="6326490" cy="4562788"/>
           </a:xfrm>
           <a:prstGeom prst="rect">
             <a:avLst/>
@@ -4987,7 +5250,7 @@
             </a:pPr>
             <a:r>
               <a:rPr lang="en-US" sz="2400" dirty="0"/>
-              <a:t>Clone copies resources to the target.</a:t>
+              <a:t>Clone operation copies resources to target.</a:t>
             </a:r>
           </a:p>
         </p:txBody>

</xml_diff>